<commit_message>
Finish final project, added viz
</commit_message>
<xml_diff>
--- a/Presentations/Final_Project.pptx
+++ b/Presentations/Final_Project.pptx
@@ -11,8 +11,15 @@
     <p:sldId id="264" r:id="rId5"/>
     <p:sldId id="265" r:id="rId6"/>
     <p:sldId id="260" r:id="rId7"/>
-    <p:sldId id="263" r:id="rId8"/>
-    <p:sldId id="262" r:id="rId9"/>
+    <p:sldId id="266" r:id="rId8"/>
+    <p:sldId id="267" r:id="rId9"/>
+    <p:sldId id="268" r:id="rId10"/>
+    <p:sldId id="270" r:id="rId11"/>
+    <p:sldId id="271" r:id="rId12"/>
+    <p:sldId id="269" r:id="rId13"/>
+    <p:sldId id="272" r:id="rId14"/>
+    <p:sldId id="263" r:id="rId15"/>
+    <p:sldId id="262" r:id="rId16"/>
   </p:sldIdLst>
   <p:sldSz cx="12192000" cy="6858000"/>
   <p:notesSz cx="6858000" cy="9144000"/>
@@ -434,7 +441,7 @@
             <a:fld id="{1449AA12-8195-4182-A7AC-2E7E59DFBDAF}" type="datetimeFigureOut">
               <a:rPr lang="en-US" smtClean="0"/>
               <a:pPr algn="r"/>
-              <a:t>11/14/2022</a:t>
+              <a:t>11/19/2022</a:t>
             </a:fld>
             <a:endParaRPr lang="en-US"/>
           </a:p>
@@ -650,7 +657,7 @@
           <a:p>
             <a:fld id="{1449AA12-8195-4182-A7AC-2E7E59DFBDAF}" type="datetimeFigureOut">
               <a:rPr lang="en-US" smtClean="0"/>
-              <a:t>11/14/2022</a:t>
+              <a:t>11/19/2022</a:t>
             </a:fld>
             <a:endParaRPr lang="en-US"/>
           </a:p>
@@ -1022,7 +1029,7 @@
           <a:p>
             <a:fld id="{1449AA12-8195-4182-A7AC-2E7E59DFBDAF}" type="datetimeFigureOut">
               <a:rPr lang="en-US" smtClean="0"/>
-              <a:t>11/14/2022</a:t>
+              <a:t>11/19/2022</a:t>
             </a:fld>
             <a:endParaRPr lang="en-US"/>
           </a:p>
@@ -1384,7 +1391,7 @@
           <a:p>
             <a:fld id="{1449AA12-8195-4182-A7AC-2E7E59DFBDAF}" type="datetimeFigureOut">
               <a:rPr lang="en-US" smtClean="0"/>
-              <a:t>11/14/2022</a:t>
+              <a:t>11/19/2022</a:t>
             </a:fld>
             <a:endParaRPr lang="en-US"/>
           </a:p>
@@ -1824,7 +1831,7 @@
           <a:p>
             <a:fld id="{1449AA12-8195-4182-A7AC-2E7E59DFBDAF}" type="datetimeFigureOut">
               <a:rPr lang="en-US" smtClean="0"/>
-              <a:t>11/14/2022</a:t>
+              <a:t>11/19/2022</a:t>
             </a:fld>
             <a:endParaRPr lang="en-US"/>
           </a:p>
@@ -2264,7 +2271,7 @@
           <a:p>
             <a:fld id="{1449AA12-8195-4182-A7AC-2E7E59DFBDAF}" type="datetimeFigureOut">
               <a:rPr lang="en-US" smtClean="0"/>
-              <a:t>11/14/2022</a:t>
+              <a:t>11/19/2022</a:t>
             </a:fld>
             <a:endParaRPr lang="en-US"/>
           </a:p>
@@ -2872,7 +2879,7 @@
           <a:p>
             <a:fld id="{1449AA12-8195-4182-A7AC-2E7E59DFBDAF}" type="datetimeFigureOut">
               <a:rPr lang="en-US" smtClean="0"/>
-              <a:t>11/14/2022</a:t>
+              <a:t>11/19/2022</a:t>
             </a:fld>
             <a:endParaRPr lang="en-US"/>
           </a:p>
@@ -3177,7 +3184,7 @@
           <a:p>
             <a:fld id="{1449AA12-8195-4182-A7AC-2E7E59DFBDAF}" type="datetimeFigureOut">
               <a:rPr lang="en-US" smtClean="0"/>
-              <a:t>11/14/2022</a:t>
+              <a:t>11/19/2022</a:t>
             </a:fld>
             <a:endParaRPr lang="en-US"/>
           </a:p>
@@ -3454,7 +3461,7 @@
           <a:p>
             <a:fld id="{1449AA12-8195-4182-A7AC-2E7E59DFBDAF}" type="datetimeFigureOut">
               <a:rPr lang="en-US" smtClean="0"/>
-              <a:t>11/14/2022</a:t>
+              <a:t>11/19/2022</a:t>
             </a:fld>
             <a:endParaRPr lang="en-US"/>
           </a:p>
@@ -3931,7 +3938,7 @@
           <a:p>
             <a:fld id="{1449AA12-8195-4182-A7AC-2E7E59DFBDAF}" type="datetimeFigureOut">
               <a:rPr lang="en-US" smtClean="0"/>
-              <a:t>11/14/2022</a:t>
+              <a:t>11/19/2022</a:t>
             </a:fld>
             <a:endParaRPr lang="en-US"/>
           </a:p>
@@ -4386,7 +4393,7 @@
           <a:p>
             <a:fld id="{1449AA12-8195-4182-A7AC-2E7E59DFBDAF}" type="datetimeFigureOut">
               <a:rPr lang="en-US" smtClean="0"/>
-              <a:t>11/14/2022</a:t>
+              <a:t>11/19/2022</a:t>
             </a:fld>
             <a:endParaRPr lang="en-US"/>
           </a:p>
@@ -4792,7 +4799,7 @@
             <a:fld id="{1449AA12-8195-4182-A7AC-2E7E59DFBDAF}" type="datetimeFigureOut">
               <a:rPr lang="en-US" smtClean="0"/>
               <a:pPr/>
-              <a:t>11/14/2022</a:t>
+              <a:t>11/19/2022</a:t>
             </a:fld>
             <a:endParaRPr lang="en-US"/>
           </a:p>
@@ -5656,6 +5663,990 @@
 </p:sld>
 </file>
 
+<file path=ppt/slides/slide10.xml><?xml version="1.0" encoding="utf-8"?>
+<p:sld xmlns:a="http://schemas.openxmlformats.org/drawingml/2006/main" xmlns:r="http://schemas.openxmlformats.org/officeDocument/2006/relationships" xmlns:p="http://schemas.openxmlformats.org/presentationml/2006/main">
+  <p:cSld>
+    <p:spTree>
+      <p:nvGrpSpPr>
+        <p:cNvPr id="1" name=""/>
+        <p:cNvGrpSpPr/>
+        <p:nvPr/>
+      </p:nvGrpSpPr>
+      <p:grpSpPr>
+        <a:xfrm>
+          <a:off x="0" y="0"/>
+          <a:ext cx="0" cy="0"/>
+          <a:chOff x="0" y="0"/>
+          <a:chExt cx="0" cy="0"/>
+        </a:xfrm>
+      </p:grpSpPr>
+      <p:sp>
+        <p:nvSpPr>
+          <p:cNvPr id="2" name="Title 1">
+            <a:extLst>
+              <a:ext uri="{FF2B5EF4-FFF2-40B4-BE49-F238E27FC236}">
+                <a16:creationId xmlns:a16="http://schemas.microsoft.com/office/drawing/2014/main" id="{2DE2DA85-8898-C2B4-CA71-47BF9D9CD5EF}"/>
+              </a:ext>
+            </a:extLst>
+          </p:cNvPr>
+          <p:cNvSpPr>
+            <a:spLocks noGrp="1"/>
+          </p:cNvSpPr>
+          <p:nvPr>
+            <p:ph type="title"/>
+          </p:nvPr>
+        </p:nvSpPr>
+        <p:spPr/>
+        <p:txBody>
+          <a:bodyPr/>
+          <a:lstStyle/>
+          <a:p>
+            <a:r>
+              <a:rPr lang="en-US" dirty="0"/>
+              <a:t>Results</a:t>
+            </a:r>
+          </a:p>
+        </p:txBody>
+      </p:sp>
+      <p:pic>
+        <p:nvPicPr>
+          <p:cNvPr id="5" name="Content Placeholder 4" descr="Diagram, histogram&#10;&#10;Description automatically generated">
+            <a:extLst>
+              <a:ext uri="{FF2B5EF4-FFF2-40B4-BE49-F238E27FC236}">
+                <a16:creationId xmlns:a16="http://schemas.microsoft.com/office/drawing/2014/main" id="{1194BC6C-E15C-7F88-A974-09B7C8C48076}"/>
+              </a:ext>
+            </a:extLst>
+          </p:cNvPr>
+          <p:cNvPicPr>
+            <a:picLocks noGrp="1" noChangeAspect="1"/>
+          </p:cNvPicPr>
+          <p:nvPr>
+            <p:ph idx="1"/>
+          </p:nvPr>
+        </p:nvPicPr>
+        <p:blipFill>
+          <a:blip r:embed="rId2">
+            <a:extLst>
+              <a:ext uri="{28A0092B-C50C-407E-A947-70E740481C1C}">
+                <a14:useLocalDpi xmlns:a14="http://schemas.microsoft.com/office/drawing/2010/main" val="0"/>
+              </a:ext>
+            </a:extLst>
+          </a:blip>
+          <a:stretch>
+            <a:fillRect/>
+          </a:stretch>
+        </p:blipFill>
+        <p:spPr>
+          <a:xfrm>
+            <a:off x="5418160" y="264452"/>
+            <a:ext cx="6486667" cy="6329096"/>
+          </a:xfrm>
+          <a:prstGeom prst="rect">
+            <a:avLst/>
+          </a:prstGeom>
+          <a:solidFill>
+            <a:srgbClr val="FFFFFF">
+              <a:shade val="85000"/>
+            </a:srgbClr>
+          </a:solidFill>
+          <a:ln w="88900" cap="sq">
+            <a:solidFill>
+              <a:srgbClr val="FFFFFF"/>
+            </a:solidFill>
+            <a:miter lim="800000"/>
+          </a:ln>
+          <a:effectLst>
+            <a:outerShdw blurRad="55000" dist="18000" dir="5400000" algn="tl" rotWithShape="0">
+              <a:srgbClr val="000000">
+                <a:alpha val="40000"/>
+              </a:srgbClr>
+            </a:outerShdw>
+          </a:effectLst>
+          <a:scene3d>
+            <a:camera prst="orthographicFront"/>
+            <a:lightRig rig="twoPt" dir="t">
+              <a:rot lat="0" lon="0" rev="7200000"/>
+            </a:lightRig>
+          </a:scene3d>
+          <a:sp3d>
+            <a:bevelT w="25400" h="19050"/>
+            <a:contourClr>
+              <a:srgbClr val="FFFFFF"/>
+            </a:contourClr>
+          </a:sp3d>
+        </p:spPr>
+      </p:pic>
+      <p:sp>
+        <p:nvSpPr>
+          <p:cNvPr id="6" name="TextBox 5">
+            <a:extLst>
+              <a:ext uri="{FF2B5EF4-FFF2-40B4-BE49-F238E27FC236}">
+                <a16:creationId xmlns:a16="http://schemas.microsoft.com/office/drawing/2014/main" id="{EB416899-2377-0996-40D3-365B24C4FF4A}"/>
+              </a:ext>
+            </a:extLst>
+          </p:cNvPr>
+          <p:cNvSpPr txBox="1"/>
+          <p:nvPr/>
+        </p:nvSpPr>
+        <p:spPr>
+          <a:xfrm>
+            <a:off x="1243619" y="5756307"/>
+            <a:ext cx="4174541" cy="646331"/>
+          </a:xfrm>
+          <a:prstGeom prst="rect">
+            <a:avLst/>
+          </a:prstGeom>
+          <a:noFill/>
+        </p:spPr>
+        <p:txBody>
+          <a:bodyPr wrap="none" rtlCol="0">
+            <a:spAutoFit/>
+          </a:bodyPr>
+          <a:lstStyle/>
+          <a:p>
+            <a:r>
+              <a:rPr lang="en-US" dirty="0"/>
+              <a:t>Initial training on Tomato data set </a:t>
+            </a:r>
+          </a:p>
+          <a:p>
+            <a:r>
+              <a:rPr lang="en-US" dirty="0"/>
+              <a:t>showed significant noise in validation</a:t>
+            </a:r>
+          </a:p>
+        </p:txBody>
+      </p:sp>
+    </p:spTree>
+    <p:extLst>
+      <p:ext uri="{BB962C8B-B14F-4D97-AF65-F5344CB8AC3E}">
+        <p14:creationId xmlns:p14="http://schemas.microsoft.com/office/powerpoint/2010/main" val="32900807"/>
+      </p:ext>
+    </p:extLst>
+  </p:cSld>
+  <p:clrMapOvr>
+    <a:masterClrMapping/>
+  </p:clrMapOvr>
+</p:sld>
+</file>
+
+<file path=ppt/slides/slide11.xml><?xml version="1.0" encoding="utf-8"?>
+<p:sld xmlns:a="http://schemas.openxmlformats.org/drawingml/2006/main" xmlns:r="http://schemas.openxmlformats.org/officeDocument/2006/relationships" xmlns:p="http://schemas.openxmlformats.org/presentationml/2006/main">
+  <p:cSld>
+    <p:spTree>
+      <p:nvGrpSpPr>
+        <p:cNvPr id="1" name=""/>
+        <p:cNvGrpSpPr/>
+        <p:nvPr/>
+      </p:nvGrpSpPr>
+      <p:grpSpPr>
+        <a:xfrm>
+          <a:off x="0" y="0"/>
+          <a:ext cx="0" cy="0"/>
+          <a:chOff x="0" y="0"/>
+          <a:chExt cx="0" cy="0"/>
+        </a:xfrm>
+      </p:grpSpPr>
+      <p:sp>
+        <p:nvSpPr>
+          <p:cNvPr id="2" name="Title 1">
+            <a:extLst>
+              <a:ext uri="{FF2B5EF4-FFF2-40B4-BE49-F238E27FC236}">
+                <a16:creationId xmlns:a16="http://schemas.microsoft.com/office/drawing/2014/main" id="{813A8805-3699-FF62-0D90-10D0C20DBE99}"/>
+              </a:ext>
+            </a:extLst>
+          </p:cNvPr>
+          <p:cNvSpPr>
+            <a:spLocks noGrp="1"/>
+          </p:cNvSpPr>
+          <p:nvPr>
+            <p:ph type="title"/>
+          </p:nvPr>
+        </p:nvSpPr>
+        <p:spPr/>
+        <p:txBody>
+          <a:bodyPr/>
+          <a:lstStyle/>
+          <a:p>
+            <a:r>
+              <a:rPr lang="en-US" dirty="0"/>
+              <a:t>Results</a:t>
+            </a:r>
+          </a:p>
+        </p:txBody>
+      </p:sp>
+      <p:pic>
+        <p:nvPicPr>
+          <p:cNvPr id="5" name="Content Placeholder 4" descr="Diagram&#10;&#10;Description automatically generated">
+            <a:extLst>
+              <a:ext uri="{FF2B5EF4-FFF2-40B4-BE49-F238E27FC236}">
+                <a16:creationId xmlns:a16="http://schemas.microsoft.com/office/drawing/2014/main" id="{FC11D684-F038-AC53-5610-37E220E3D674}"/>
+              </a:ext>
+            </a:extLst>
+          </p:cNvPr>
+          <p:cNvPicPr>
+            <a:picLocks noGrp="1" noChangeAspect="1"/>
+          </p:cNvPicPr>
+          <p:nvPr>
+            <p:ph idx="1"/>
+          </p:nvPr>
+        </p:nvPicPr>
+        <p:blipFill>
+          <a:blip r:embed="rId2">
+            <a:extLst>
+              <a:ext uri="{28A0092B-C50C-407E-A947-70E740481C1C}">
+                <a14:useLocalDpi xmlns:a14="http://schemas.microsoft.com/office/drawing/2010/main" val="0"/>
+              </a:ext>
+            </a:extLst>
+          </a:blip>
+          <a:stretch>
+            <a:fillRect/>
+          </a:stretch>
+        </p:blipFill>
+        <p:spPr>
+          <a:xfrm>
+            <a:off x="5704764" y="354842"/>
+            <a:ext cx="6311104" cy="6285025"/>
+          </a:xfrm>
+          <a:prstGeom prst="rect">
+            <a:avLst/>
+          </a:prstGeom>
+          <a:solidFill>
+            <a:srgbClr val="FFFFFF">
+              <a:shade val="85000"/>
+            </a:srgbClr>
+          </a:solidFill>
+          <a:ln w="88900" cap="sq">
+            <a:solidFill>
+              <a:srgbClr val="FFFFFF"/>
+            </a:solidFill>
+            <a:miter lim="800000"/>
+          </a:ln>
+          <a:effectLst>
+            <a:outerShdw blurRad="55000" dist="18000" dir="5400000" algn="tl" rotWithShape="0">
+              <a:srgbClr val="000000">
+                <a:alpha val="40000"/>
+              </a:srgbClr>
+            </a:outerShdw>
+          </a:effectLst>
+          <a:scene3d>
+            <a:camera prst="orthographicFront"/>
+            <a:lightRig rig="twoPt" dir="t">
+              <a:rot lat="0" lon="0" rev="7200000"/>
+            </a:lightRig>
+          </a:scene3d>
+          <a:sp3d>
+            <a:bevelT w="25400" h="19050"/>
+            <a:contourClr>
+              <a:srgbClr val="FFFFFF"/>
+            </a:contourClr>
+          </a:sp3d>
+        </p:spPr>
+      </p:pic>
+      <p:sp>
+        <p:nvSpPr>
+          <p:cNvPr id="6" name="TextBox 5">
+            <a:extLst>
+              <a:ext uri="{FF2B5EF4-FFF2-40B4-BE49-F238E27FC236}">
+                <a16:creationId xmlns:a16="http://schemas.microsoft.com/office/drawing/2014/main" id="{537F69B9-D663-8853-5DF7-8904004B4289}"/>
+              </a:ext>
+            </a:extLst>
+          </p:cNvPr>
+          <p:cNvSpPr txBox="1"/>
+          <p:nvPr/>
+        </p:nvSpPr>
+        <p:spPr>
+          <a:xfrm>
+            <a:off x="1417893" y="5479308"/>
+            <a:ext cx="3866606" cy="923330"/>
+          </a:xfrm>
+          <a:prstGeom prst="rect">
+            <a:avLst/>
+          </a:prstGeom>
+          <a:noFill/>
+        </p:spPr>
+        <p:txBody>
+          <a:bodyPr wrap="square" rtlCol="0">
+            <a:spAutoFit/>
+          </a:bodyPr>
+          <a:lstStyle/>
+          <a:p>
+            <a:r>
+              <a:rPr lang="en-US" dirty="0"/>
+              <a:t>After some parameter tuning, noise was decreased with a small drop in peak accuracy.</a:t>
+            </a:r>
+          </a:p>
+        </p:txBody>
+      </p:sp>
+    </p:spTree>
+    <p:extLst>
+      <p:ext uri="{BB962C8B-B14F-4D97-AF65-F5344CB8AC3E}">
+        <p14:creationId xmlns:p14="http://schemas.microsoft.com/office/powerpoint/2010/main" val="876079445"/>
+      </p:ext>
+    </p:extLst>
+  </p:cSld>
+  <p:clrMapOvr>
+    <a:masterClrMapping/>
+  </p:clrMapOvr>
+</p:sld>
+</file>
+
+<file path=ppt/slides/slide12.xml><?xml version="1.0" encoding="utf-8"?>
+<p:sld xmlns:a="http://schemas.openxmlformats.org/drawingml/2006/main" xmlns:r="http://schemas.openxmlformats.org/officeDocument/2006/relationships" xmlns:p="http://schemas.openxmlformats.org/presentationml/2006/main">
+  <p:cSld>
+    <p:spTree>
+      <p:nvGrpSpPr>
+        <p:cNvPr id="1" name=""/>
+        <p:cNvGrpSpPr/>
+        <p:nvPr/>
+      </p:nvGrpSpPr>
+      <p:grpSpPr>
+        <a:xfrm>
+          <a:off x="0" y="0"/>
+          <a:ext cx="0" cy="0"/>
+          <a:chOff x="0" y="0"/>
+          <a:chExt cx="0" cy="0"/>
+        </a:xfrm>
+      </p:grpSpPr>
+      <p:sp>
+        <p:nvSpPr>
+          <p:cNvPr id="2" name="Title 1">
+            <a:extLst>
+              <a:ext uri="{FF2B5EF4-FFF2-40B4-BE49-F238E27FC236}">
+                <a16:creationId xmlns:a16="http://schemas.microsoft.com/office/drawing/2014/main" id="{083DD586-9B5B-14A8-30FC-E549C575D534}"/>
+              </a:ext>
+            </a:extLst>
+          </p:cNvPr>
+          <p:cNvSpPr>
+            <a:spLocks noGrp="1"/>
+          </p:cNvSpPr>
+          <p:nvPr>
+            <p:ph type="title"/>
+          </p:nvPr>
+        </p:nvSpPr>
+        <p:spPr>
+          <a:xfrm>
+            <a:off x="1587710" y="455363"/>
+            <a:ext cx="9486690" cy="1132138"/>
+          </a:xfrm>
+        </p:spPr>
+        <p:txBody>
+          <a:bodyPr/>
+          <a:lstStyle/>
+          <a:p>
+            <a:r>
+              <a:rPr lang="en-US" dirty="0"/>
+              <a:t>Results</a:t>
+            </a:r>
+          </a:p>
+        </p:txBody>
+      </p:sp>
+      <p:sp>
+        <p:nvSpPr>
+          <p:cNvPr id="3" name="Content Placeholder 2">
+            <a:extLst>
+              <a:ext uri="{FF2B5EF4-FFF2-40B4-BE49-F238E27FC236}">
+                <a16:creationId xmlns:a16="http://schemas.microsoft.com/office/drawing/2014/main" id="{6CEC4071-B97A-70F8-94F1-A199DE4599F8}"/>
+              </a:ext>
+            </a:extLst>
+          </p:cNvPr>
+          <p:cNvSpPr>
+            <a:spLocks noGrp="1"/>
+          </p:cNvSpPr>
+          <p:nvPr>
+            <p:ph idx="1"/>
+          </p:nvPr>
+        </p:nvSpPr>
+        <p:spPr>
+          <a:xfrm>
+            <a:off x="1587710" y="1587501"/>
+            <a:ext cx="9486690" cy="4498667"/>
+          </a:xfrm>
+        </p:spPr>
+        <p:txBody>
+          <a:bodyPr/>
+          <a:lstStyle/>
+          <a:p>
+            <a:r>
+              <a:rPr lang="en-US" dirty="0"/>
+              <a:t>Initial training of a more robust model architecture on the Tomato dataset yielded results of ~88%. </a:t>
+            </a:r>
+          </a:p>
+          <a:p>
+            <a:r>
+              <a:rPr lang="en-US" dirty="0"/>
+              <a:t>These results showed erratic accuracy in validation data initially. This was likely a result of noise in predictions.</a:t>
+            </a:r>
+          </a:p>
+          <a:p>
+            <a:r>
+              <a:rPr lang="en-US" dirty="0"/>
+              <a:t>To remedy this problem, dropout layers were introduced, and the learning rate was decreased. This did appear to have some effect on the noise issue. </a:t>
+            </a:r>
+          </a:p>
+          <a:p>
+            <a:r>
+              <a:rPr lang="en-US" dirty="0"/>
+              <a:t>Further training on more robust hardware would likely yield the desired results. Considering the data set size, processing time when the number of epochs were increased resulted in hardware issues. </a:t>
+            </a:r>
+          </a:p>
+        </p:txBody>
+      </p:sp>
+    </p:spTree>
+    <p:extLst>
+      <p:ext uri="{BB962C8B-B14F-4D97-AF65-F5344CB8AC3E}">
+        <p14:creationId xmlns:p14="http://schemas.microsoft.com/office/powerpoint/2010/main" val="2004254515"/>
+      </p:ext>
+    </p:extLst>
+  </p:cSld>
+  <p:clrMapOvr>
+    <a:masterClrMapping/>
+  </p:clrMapOvr>
+</p:sld>
+</file>
+
+<file path=ppt/slides/slide13.xml><?xml version="1.0" encoding="utf-8"?>
+<p:sld xmlns:a="http://schemas.openxmlformats.org/drawingml/2006/main" xmlns:r="http://schemas.openxmlformats.org/officeDocument/2006/relationships" xmlns:p="http://schemas.openxmlformats.org/presentationml/2006/main">
+  <p:cSld>
+    <p:spTree>
+      <p:nvGrpSpPr>
+        <p:cNvPr id="1" name=""/>
+        <p:cNvGrpSpPr/>
+        <p:nvPr/>
+      </p:nvGrpSpPr>
+      <p:grpSpPr>
+        <a:xfrm>
+          <a:off x="0" y="0"/>
+          <a:ext cx="0" cy="0"/>
+          <a:chOff x="0" y="0"/>
+          <a:chExt cx="0" cy="0"/>
+        </a:xfrm>
+      </p:grpSpPr>
+      <p:sp>
+        <p:nvSpPr>
+          <p:cNvPr id="2" name="Title 1">
+            <a:extLst>
+              <a:ext uri="{FF2B5EF4-FFF2-40B4-BE49-F238E27FC236}">
+                <a16:creationId xmlns:a16="http://schemas.microsoft.com/office/drawing/2014/main" id="{283E2656-8C5E-A5EE-88E0-4DF052AE544E}"/>
+              </a:ext>
+            </a:extLst>
+          </p:cNvPr>
+          <p:cNvSpPr>
+            <a:spLocks noGrp="1"/>
+          </p:cNvSpPr>
+          <p:nvPr>
+            <p:ph type="title"/>
+          </p:nvPr>
+        </p:nvSpPr>
+        <p:spPr/>
+        <p:txBody>
+          <a:bodyPr/>
+          <a:lstStyle/>
+          <a:p>
+            <a:r>
+              <a:rPr lang="en-US" dirty="0"/>
+              <a:t>Conclusion</a:t>
+            </a:r>
+          </a:p>
+        </p:txBody>
+      </p:sp>
+      <p:sp>
+        <p:nvSpPr>
+          <p:cNvPr id="3" name="Content Placeholder 2">
+            <a:extLst>
+              <a:ext uri="{FF2B5EF4-FFF2-40B4-BE49-F238E27FC236}">
+                <a16:creationId xmlns:a16="http://schemas.microsoft.com/office/drawing/2014/main" id="{7F8E1C8E-C33F-BC6F-D5A2-A701D76A7A99}"/>
+              </a:ext>
+            </a:extLst>
+          </p:cNvPr>
+          <p:cNvSpPr>
+            <a:spLocks noGrp="1"/>
+          </p:cNvSpPr>
+          <p:nvPr>
+            <p:ph idx="1"/>
+          </p:nvPr>
+        </p:nvSpPr>
+        <p:spPr/>
+        <p:txBody>
+          <a:bodyPr>
+            <a:normAutofit fontScale="92500"/>
+          </a:bodyPr>
+          <a:lstStyle/>
+          <a:p>
+            <a:r>
+              <a:rPr lang="en-US" dirty="0"/>
+              <a:t>With the implementation of field hardware, this method represents a viable option to monitor and offer rapid alerts to assist in plant pathology concerns. </a:t>
+            </a:r>
+          </a:p>
+          <a:p>
+            <a:r>
+              <a:rPr lang="en-US" dirty="0"/>
+              <a:t>There are other options in packages that should be explored, such as </a:t>
+            </a:r>
+            <a:r>
+              <a:rPr lang="en-US" dirty="0" err="1"/>
+              <a:t>PyTorch</a:t>
+            </a:r>
+            <a:r>
+              <a:rPr lang="en-US" dirty="0"/>
+              <a:t> for image classification. </a:t>
+            </a:r>
+          </a:p>
+          <a:p>
+            <a:r>
+              <a:rPr lang="en-US" dirty="0"/>
+              <a:t>Hardware should be considered when processing equipment is chosen. Cloud options may prove to be beneficial, but would come with an increase in cost. </a:t>
+            </a:r>
+          </a:p>
+          <a:p>
+            <a:r>
+              <a:rPr lang="en-US" dirty="0"/>
+              <a:t>Field deployment should be explored. Cloud solutions and </a:t>
+            </a:r>
+            <a:r>
+              <a:rPr lang="en-US" dirty="0" err="1"/>
+              <a:t>TFLite</a:t>
+            </a:r>
+            <a:r>
+              <a:rPr lang="en-US" dirty="0"/>
+              <a:t> are options to explore. IoT sensors, such as a connected group of cameras are options worth considering. </a:t>
+            </a:r>
+          </a:p>
+        </p:txBody>
+      </p:sp>
+    </p:spTree>
+    <p:extLst>
+      <p:ext uri="{BB962C8B-B14F-4D97-AF65-F5344CB8AC3E}">
+        <p14:creationId xmlns:p14="http://schemas.microsoft.com/office/powerpoint/2010/main" val="762420014"/>
+      </p:ext>
+    </p:extLst>
+  </p:cSld>
+  <p:clrMapOvr>
+    <a:masterClrMapping/>
+  </p:clrMapOvr>
+</p:sld>
+</file>
+
+<file path=ppt/slides/slide14.xml><?xml version="1.0" encoding="utf-8"?>
+<p:sld xmlns:a="http://schemas.openxmlformats.org/drawingml/2006/main" xmlns:r="http://schemas.openxmlformats.org/officeDocument/2006/relationships" xmlns:p="http://schemas.openxmlformats.org/presentationml/2006/main">
+  <p:cSld>
+    <p:spTree>
+      <p:nvGrpSpPr>
+        <p:cNvPr id="1" name=""/>
+        <p:cNvGrpSpPr/>
+        <p:nvPr/>
+      </p:nvGrpSpPr>
+      <p:grpSpPr>
+        <a:xfrm>
+          <a:off x="0" y="0"/>
+          <a:ext cx="0" cy="0"/>
+          <a:chOff x="0" y="0"/>
+          <a:chExt cx="0" cy="0"/>
+        </a:xfrm>
+      </p:grpSpPr>
+      <p:sp>
+        <p:nvSpPr>
+          <p:cNvPr id="2" name="Title 1">
+            <a:extLst>
+              <a:ext uri="{FF2B5EF4-FFF2-40B4-BE49-F238E27FC236}">
+                <a16:creationId xmlns:a16="http://schemas.microsoft.com/office/drawing/2014/main" id="{C645F9DC-9B7C-46D0-A66B-98215B3B3211}"/>
+              </a:ext>
+            </a:extLst>
+          </p:cNvPr>
+          <p:cNvSpPr>
+            <a:spLocks noGrp="1"/>
+          </p:cNvSpPr>
+          <p:nvPr>
+            <p:ph type="title"/>
+          </p:nvPr>
+        </p:nvSpPr>
+        <p:spPr/>
+        <p:txBody>
+          <a:bodyPr/>
+          <a:lstStyle/>
+          <a:p>
+            <a:r>
+              <a:rPr lang="en-US" dirty="0"/>
+              <a:t>References</a:t>
+            </a:r>
+          </a:p>
+        </p:txBody>
+      </p:sp>
+      <p:sp>
+        <p:nvSpPr>
+          <p:cNvPr id="3" name="Content Placeholder 2">
+            <a:extLst>
+              <a:ext uri="{FF2B5EF4-FFF2-40B4-BE49-F238E27FC236}">
+                <a16:creationId xmlns:a16="http://schemas.microsoft.com/office/drawing/2014/main" id="{95EBC6B1-4DAA-D547-1F5F-24A663A851F6}"/>
+              </a:ext>
+            </a:extLst>
+          </p:cNvPr>
+          <p:cNvSpPr>
+            <a:spLocks noGrp="1"/>
+          </p:cNvSpPr>
+          <p:nvPr>
+            <p:ph idx="1"/>
+          </p:nvPr>
+        </p:nvSpPr>
+        <p:spPr>
+          <a:xfrm>
+            <a:off x="1587710" y="1435100"/>
+            <a:ext cx="9486690" cy="4967538"/>
+          </a:xfrm>
+        </p:spPr>
+        <p:txBody>
+          <a:bodyPr>
+            <a:normAutofit fontScale="85000" lnSpcReduction="20000"/>
+          </a:bodyPr>
+          <a:lstStyle/>
+          <a:p>
+            <a:pPr marL="0" indent="0" algn="ctr">
+              <a:buNone/>
+            </a:pPr>
+            <a:endParaRPr lang="en-US" dirty="0">
+              <a:effectLst/>
+            </a:endParaRPr>
+          </a:p>
+          <a:p>
+            <a:pPr>
+              <a:spcAft>
+                <a:spcPts val="0"/>
+              </a:spcAft>
+            </a:pPr>
+            <a:r>
+              <a:rPr lang="en-US" dirty="0">
+                <a:effectLst/>
+              </a:rPr>
+              <a:t>Bi, L., &amp; Hu, G. (2020). Improving image-based plant disease classification with generative adversarial network under limited training set. </a:t>
+            </a:r>
+            <a:r>
+              <a:rPr lang="en-US" i="1" dirty="0">
+                <a:effectLst/>
+              </a:rPr>
+              <a:t>Frontiers in Plant Science</a:t>
+            </a:r>
+            <a:r>
+              <a:rPr lang="en-US" dirty="0">
+                <a:effectLst/>
+              </a:rPr>
+              <a:t>, </a:t>
+            </a:r>
+            <a:r>
+              <a:rPr lang="en-US" i="1" dirty="0">
+                <a:effectLst/>
+              </a:rPr>
+              <a:t>11</a:t>
+            </a:r>
+            <a:r>
+              <a:rPr lang="en-US" dirty="0">
+                <a:effectLst/>
+              </a:rPr>
+              <a:t>, 583438. https://doi.org/10.3389/fpls.2020.583438</a:t>
+            </a:r>
+          </a:p>
+          <a:p>
+            <a:pPr>
+              <a:spcAft>
+                <a:spcPts val="0"/>
+              </a:spcAft>
+            </a:pPr>
+            <a:r>
+              <a:rPr lang="en-US" dirty="0">
+                <a:effectLst/>
+              </a:rPr>
+              <a:t>Mohanty, S. P., Hughes, D. P., &amp; </a:t>
+            </a:r>
+            <a:r>
+              <a:rPr lang="en-US" dirty="0" err="1">
+                <a:effectLst/>
+              </a:rPr>
+              <a:t>Salathé</a:t>
+            </a:r>
+            <a:r>
+              <a:rPr lang="en-US" dirty="0">
+                <a:effectLst/>
+              </a:rPr>
+              <a:t>, M. (2016). Using deep learning for image-based plant disease detection. </a:t>
+            </a:r>
+            <a:r>
+              <a:rPr lang="en-US" i="1" dirty="0">
+                <a:effectLst/>
+              </a:rPr>
+              <a:t>Frontiers in Plant Science</a:t>
+            </a:r>
+            <a:r>
+              <a:rPr lang="en-US" dirty="0">
+                <a:effectLst/>
+              </a:rPr>
+              <a:t>, </a:t>
+            </a:r>
+            <a:r>
+              <a:rPr lang="en-US" i="1" dirty="0">
+                <a:effectLst/>
+              </a:rPr>
+              <a:t>7</a:t>
+            </a:r>
+            <a:r>
+              <a:rPr lang="en-US" dirty="0">
+                <a:effectLst/>
+              </a:rPr>
+              <a:t>, 1419. https://doi.org/10.3389/fpls.2016.01419</a:t>
+            </a:r>
+          </a:p>
+          <a:p>
+            <a:pPr>
+              <a:spcAft>
+                <a:spcPts val="0"/>
+              </a:spcAft>
+            </a:pPr>
+            <a:r>
+              <a:rPr lang="en-US" dirty="0">
+                <a:effectLst/>
+              </a:rPr>
+              <a:t>Paymode, A. S., &amp; </a:t>
+            </a:r>
+            <a:r>
+              <a:rPr lang="en-US" dirty="0" err="1">
+                <a:effectLst/>
+              </a:rPr>
+              <a:t>Malode</a:t>
+            </a:r>
+            <a:r>
+              <a:rPr lang="en-US" dirty="0">
+                <a:effectLst/>
+              </a:rPr>
+              <a:t>, V. B. (2022). Transfer learning for multi-crop leaf disease image classification using convolutional neural network VGG. </a:t>
+            </a:r>
+            <a:r>
+              <a:rPr lang="en-US" i="1" dirty="0">
+                <a:effectLst/>
+              </a:rPr>
+              <a:t>Artificial Intelligence in Agriculture</a:t>
+            </a:r>
+            <a:r>
+              <a:rPr lang="en-US" dirty="0">
+                <a:effectLst/>
+              </a:rPr>
+              <a:t>, </a:t>
+            </a:r>
+            <a:r>
+              <a:rPr lang="en-US" i="1" dirty="0">
+                <a:effectLst/>
+              </a:rPr>
+              <a:t>6</a:t>
+            </a:r>
+            <a:r>
+              <a:rPr lang="en-US" dirty="0">
+                <a:effectLst/>
+              </a:rPr>
+              <a:t>, 23–33. https://doi.org/10.1016/j.aiia.2021.12.002</a:t>
+            </a:r>
+          </a:p>
+          <a:p>
+            <a:pPr>
+              <a:spcAft>
+                <a:spcPts val="0"/>
+              </a:spcAft>
+            </a:pPr>
+            <a:r>
+              <a:rPr lang="en-US" dirty="0">
+                <a:effectLst/>
+              </a:rPr>
+              <a:t>Riley, M., Williamson, M., &amp; </a:t>
+            </a:r>
+            <a:r>
+              <a:rPr lang="en-US" dirty="0" err="1">
+                <a:effectLst/>
+              </a:rPr>
+              <a:t>Maloy</a:t>
+            </a:r>
+            <a:r>
+              <a:rPr lang="en-US" dirty="0">
+                <a:effectLst/>
+              </a:rPr>
+              <a:t>, O. (2002). ​​​Plant Disease Diagnosis. </a:t>
+            </a:r>
+            <a:r>
+              <a:rPr lang="en-US" i="1" dirty="0">
+                <a:effectLst/>
+              </a:rPr>
+              <a:t>Plant Health Instructor</a:t>
+            </a:r>
+            <a:r>
+              <a:rPr lang="en-US" dirty="0">
+                <a:effectLst/>
+              </a:rPr>
+              <a:t>. https://doi.org/10.1094/phi-i-2002-1021-01</a:t>
+            </a:r>
+          </a:p>
+          <a:p>
+            <a:pPr>
+              <a:spcAft>
+                <a:spcPts val="0"/>
+              </a:spcAft>
+            </a:pPr>
+            <a:r>
+              <a:rPr lang="en-US" i="1" dirty="0">
+                <a:effectLst/>
+              </a:rPr>
+              <a:t>USDA APHIS</a:t>
+            </a:r>
+            <a:r>
+              <a:rPr lang="en-US" dirty="0">
+                <a:effectLst/>
+              </a:rPr>
+              <a:t>. (2022, April 5). Usda.gov. https://www.aphis.usda.gov/aphis/newsroom/news/sa_by_date/sa-2022/protect-plants</a:t>
+            </a:r>
+          </a:p>
+          <a:p>
+            <a:endParaRPr lang="en-US" u="sng" dirty="0"/>
+          </a:p>
+        </p:txBody>
+      </p:sp>
+    </p:spTree>
+    <p:extLst>
+      <p:ext uri="{BB962C8B-B14F-4D97-AF65-F5344CB8AC3E}">
+        <p14:creationId xmlns:p14="http://schemas.microsoft.com/office/powerpoint/2010/main" val="1628078696"/>
+      </p:ext>
+    </p:extLst>
+  </p:cSld>
+  <p:clrMapOvr>
+    <a:masterClrMapping/>
+  </p:clrMapOvr>
+</p:sld>
+</file>
+
+<file path=ppt/slides/slide15.xml><?xml version="1.0" encoding="utf-8"?>
+<p:sld xmlns:a="http://schemas.openxmlformats.org/drawingml/2006/main" xmlns:r="http://schemas.openxmlformats.org/officeDocument/2006/relationships" xmlns:p="http://schemas.openxmlformats.org/presentationml/2006/main">
+  <p:cSld>
+    <p:spTree>
+      <p:nvGrpSpPr>
+        <p:cNvPr id="1" name=""/>
+        <p:cNvGrpSpPr/>
+        <p:nvPr/>
+      </p:nvGrpSpPr>
+      <p:grpSpPr>
+        <a:xfrm>
+          <a:off x="0" y="0"/>
+          <a:ext cx="0" cy="0"/>
+          <a:chOff x="0" y="0"/>
+          <a:chExt cx="0" cy="0"/>
+        </a:xfrm>
+      </p:grpSpPr>
+      <p:sp>
+        <p:nvSpPr>
+          <p:cNvPr id="2" name="Title 1">
+            <a:extLst>
+              <a:ext uri="{FF2B5EF4-FFF2-40B4-BE49-F238E27FC236}">
+                <a16:creationId xmlns:a16="http://schemas.microsoft.com/office/drawing/2014/main" id="{8B472E40-A2BE-1024-D8D2-F2330E4A348F}"/>
+              </a:ext>
+            </a:extLst>
+          </p:cNvPr>
+          <p:cNvSpPr>
+            <a:spLocks noGrp="1"/>
+          </p:cNvSpPr>
+          <p:nvPr>
+            <p:ph type="title"/>
+          </p:nvPr>
+        </p:nvSpPr>
+        <p:spPr/>
+        <p:txBody>
+          <a:bodyPr/>
+          <a:lstStyle/>
+          <a:p>
+            <a:r>
+              <a:rPr lang="en-US" dirty="0"/>
+              <a:t>Contact</a:t>
+            </a:r>
+          </a:p>
+        </p:txBody>
+      </p:sp>
+      <p:sp>
+        <p:nvSpPr>
+          <p:cNvPr id="3" name="Content Placeholder 2">
+            <a:extLst>
+              <a:ext uri="{FF2B5EF4-FFF2-40B4-BE49-F238E27FC236}">
+                <a16:creationId xmlns:a16="http://schemas.microsoft.com/office/drawing/2014/main" id="{E2ACE288-6838-DC0A-13FF-EA71F2B88875}"/>
+              </a:ext>
+            </a:extLst>
+          </p:cNvPr>
+          <p:cNvSpPr>
+            <a:spLocks noGrp="1"/>
+          </p:cNvSpPr>
+          <p:nvPr>
+            <p:ph idx="1"/>
+          </p:nvPr>
+        </p:nvSpPr>
+        <p:spPr/>
+        <p:txBody>
+          <a:bodyPr/>
+          <a:lstStyle/>
+          <a:p>
+            <a:r>
+              <a:rPr lang="en-US" dirty="0">
+                <a:hlinkClick r:id="rId2"/>
+              </a:rPr>
+              <a:t>tteasdale@regis.edu</a:t>
+            </a:r>
+            <a:endParaRPr lang="en-US" dirty="0"/>
+          </a:p>
+          <a:p>
+            <a:pPr marL="0" indent="0">
+              <a:buNone/>
+            </a:pPr>
+            <a:endParaRPr lang="en-US" dirty="0"/>
+          </a:p>
+        </p:txBody>
+      </p:sp>
+      <p:pic>
+        <p:nvPicPr>
+          <p:cNvPr id="5" name="Picture 4" descr="A person holding a fish&#10;&#10;Description automatically generated with medium confidence">
+            <a:extLst>
+              <a:ext uri="{FF2B5EF4-FFF2-40B4-BE49-F238E27FC236}">
+                <a16:creationId xmlns:a16="http://schemas.microsoft.com/office/drawing/2014/main" id="{CEC5C0C7-E497-308D-C037-B2F704001494}"/>
+              </a:ext>
+            </a:extLst>
+          </p:cNvPr>
+          <p:cNvPicPr>
+            <a:picLocks noChangeAspect="1"/>
+          </p:cNvPicPr>
+          <p:nvPr/>
+        </p:nvPicPr>
+        <p:blipFill>
+          <a:blip r:embed="rId3">
+            <a:extLst>
+              <a:ext uri="{28A0092B-C50C-407E-A947-70E740481C1C}">
+                <a14:useLocalDpi xmlns:a14="http://schemas.microsoft.com/office/drawing/2010/main" val="0"/>
+              </a:ext>
+            </a:extLst>
+          </a:blip>
+          <a:stretch>
+            <a:fillRect/>
+          </a:stretch>
+        </p:blipFill>
+        <p:spPr>
+          <a:xfrm>
+            <a:off x="6096000" y="2222828"/>
+            <a:ext cx="5904345" cy="4428259"/>
+          </a:xfrm>
+          <a:prstGeom prst="rect">
+            <a:avLst/>
+          </a:prstGeom>
+        </p:spPr>
+      </p:pic>
+    </p:spTree>
+    <p:extLst>
+      <p:ext uri="{BB962C8B-B14F-4D97-AF65-F5344CB8AC3E}">
+        <p14:creationId xmlns:p14="http://schemas.microsoft.com/office/powerpoint/2010/main" val="258563018"/>
+      </p:ext>
+    </p:extLst>
+  </p:cSld>
+  <p:clrMapOvr>
+    <a:masterClrMapping/>
+  </p:clrMapOvr>
+</p:sld>
+</file>
+
 <file path=ppt/slides/slide2.xml><?xml version="1.0" encoding="utf-8"?>
 <p:sld xmlns:a="http://schemas.openxmlformats.org/drawingml/2006/main" xmlns:r="http://schemas.openxmlformats.org/officeDocument/2006/relationships" xmlns:p="http://schemas.openxmlformats.org/presentationml/2006/main">
   <p:cSld>
@@ -6147,6 +7138,12 @@
             <a:r>
               <a:rPr lang="en-US" dirty="0"/>
               <a:t>The data consisted of two sets (general plant and tomato specific) and a total of 44,469 individual pictures and 23 classes. </a:t>
+            </a:r>
+          </a:p>
+          <a:p>
+            <a:r>
+              <a:rPr lang="en-US" dirty="0"/>
+              <a:t>Some methods included to increase model accuracy were data augmentation and auto-tuning of parameters. </a:t>
             </a:r>
           </a:p>
           <a:p>
@@ -6594,7 +7591,7 @@
           <a:p>
             <a:r>
               <a:rPr lang="en-US" dirty="0"/>
-              <a:t>This is one of the reasons why the Tomato data set performed better in modeling.  </a:t>
+              <a:t>This is one of the reasons why the Tomato data set performed better in modeling, as will be shown in the following results section of this report. </a:t>
             </a:r>
           </a:p>
         </p:txBody>
@@ -6634,7 +7631,7 @@
           <p:cNvPr id="2" name="Title 1">
             <a:extLst>
               <a:ext uri="{FF2B5EF4-FFF2-40B4-BE49-F238E27FC236}">
-                <a16:creationId xmlns:a16="http://schemas.microsoft.com/office/drawing/2014/main" id="{C645F9DC-9B7C-46D0-A66B-98215B3B3211}"/>
+                <a16:creationId xmlns:a16="http://schemas.microsoft.com/office/drawing/2014/main" id="{0E08A55A-CD6D-7F49-211E-07FB2CDD304E}"/>
               </a:ext>
             </a:extLst>
           </p:cNvPr>
@@ -6652,7 +7649,7 @@
           <a:p>
             <a:r>
               <a:rPr lang="en-US" dirty="0"/>
-              <a:t>References</a:t>
+              <a:t>Results</a:t>
             </a:r>
           </a:p>
         </p:txBody>
@@ -6662,7 +7659,7 @@
           <p:cNvPr id="3" name="Content Placeholder 2">
             <a:extLst>
               <a:ext uri="{FF2B5EF4-FFF2-40B4-BE49-F238E27FC236}">
-                <a16:creationId xmlns:a16="http://schemas.microsoft.com/office/drawing/2014/main" id="{95EBC6B1-4DAA-D547-1F5F-24A663A851F6}"/>
+                <a16:creationId xmlns:a16="http://schemas.microsoft.com/office/drawing/2014/main" id="{020C4B00-D926-0659-307F-D1EA51F62E4B}"/>
               </a:ext>
             </a:extLst>
           </p:cNvPr>
@@ -6679,33 +7676,16 @@
           <a:lstStyle/>
           <a:p>
             <a:r>
-              <a:rPr lang="en-US" i="1" dirty="0"/>
-              <a:t>USDA APHIS</a:t>
-            </a:r>
-            <a:r>
               <a:rPr lang="en-US" dirty="0"/>
-              <a:t>. (2022, April 5). Usda.gov. </a:t>
-            </a:r>
-            <a:r>
-              <a:rPr lang="en-US" dirty="0">
-                <a:hlinkClick r:id="rId2"/>
-              </a:rPr>
-              <a:t>	</a:t>
-            </a:r>
-            <a:r>
-              <a:rPr lang="en-US" u="sng" dirty="0">
-                <a:hlinkClick r:id="rId2"/>
-              </a:rPr>
-              <a:t>https://www.aphis.usda.gov/aphis/newsroom/news/sa_by_date/       	sa-2022/protect-plants</a:t>
-            </a:r>
-            <a:endParaRPr lang="en-US" u="sng" dirty="0"/>
+              <a:t>Initial accuracy of the model on the General Plant dataset showed about 66% accuracy on the validation data. Auto-tuning of parameters was employed, and accuracy improved slightly to 78%. </a:t>
+            </a:r>
           </a:p>
         </p:txBody>
       </p:sp>
     </p:spTree>
     <p:extLst>
       <p:ext uri="{BB962C8B-B14F-4D97-AF65-F5344CB8AC3E}">
-        <p14:creationId xmlns:p14="http://schemas.microsoft.com/office/powerpoint/2010/main" val="1628078696"/>
+        <p14:creationId xmlns:p14="http://schemas.microsoft.com/office/powerpoint/2010/main" val="405670131"/>
       </p:ext>
     </p:extLst>
   </p:cSld>
@@ -6737,7 +7717,7 @@
           <p:cNvPr id="2" name="Title 1">
             <a:extLst>
               <a:ext uri="{FF2B5EF4-FFF2-40B4-BE49-F238E27FC236}">
-                <a16:creationId xmlns:a16="http://schemas.microsoft.com/office/drawing/2014/main" id="{8B472E40-A2BE-1024-D8D2-F2330E4A348F}"/>
+                <a16:creationId xmlns:a16="http://schemas.microsoft.com/office/drawing/2014/main" id="{826A87C2-860F-8FB0-BCD9-A870F3F9BA5B}"/>
               </a:ext>
             </a:extLst>
           </p:cNvPr>
@@ -6755,54 +7735,17 @@
           <a:p>
             <a:r>
               <a:rPr lang="en-US" dirty="0"/>
-              <a:t>Contact</a:t>
-            </a:r>
-          </a:p>
-        </p:txBody>
-      </p:sp>
-      <p:sp>
-        <p:nvSpPr>
-          <p:cNvPr id="3" name="Content Placeholder 2">
-            <a:extLst>
-              <a:ext uri="{FF2B5EF4-FFF2-40B4-BE49-F238E27FC236}">
-                <a16:creationId xmlns:a16="http://schemas.microsoft.com/office/drawing/2014/main" id="{E2ACE288-6838-DC0A-13FF-EA71F2B88875}"/>
-              </a:ext>
-            </a:extLst>
-          </p:cNvPr>
-          <p:cNvSpPr>
-            <a:spLocks noGrp="1"/>
-          </p:cNvSpPr>
-          <p:nvPr>
-            <p:ph idx="1"/>
-          </p:nvPr>
-        </p:nvSpPr>
-        <p:spPr/>
-        <p:txBody>
-          <a:bodyPr/>
-          <a:lstStyle/>
-          <a:p>
-            <a:r>
-              <a:rPr lang="en-US" dirty="0">
-                <a:hlinkClick r:id="rId2"/>
-              </a:rPr>
-              <a:t>tteasdale@regis.edu</a:t>
-            </a:r>
-            <a:endParaRPr lang="en-US" dirty="0"/>
-          </a:p>
-          <a:p>
-            <a:pPr marL="0" indent="0">
-              <a:buNone/>
-            </a:pPr>
-            <a:endParaRPr lang="en-US" dirty="0"/>
+              <a:t>Results</a:t>
+            </a:r>
           </a:p>
         </p:txBody>
       </p:sp>
       <p:pic>
         <p:nvPicPr>
-          <p:cNvPr id="5" name="Picture 4" descr="A person holding a fish&#10;&#10;Description automatically generated with medium confidence">
-            <a:extLst>
-              <a:ext uri="{FF2B5EF4-FFF2-40B4-BE49-F238E27FC236}">
-                <a16:creationId xmlns:a16="http://schemas.microsoft.com/office/drawing/2014/main" id="{CEC5C0C7-E497-308D-C037-B2F704001494}"/>
+          <p:cNvPr id="4" name="Picture 3">
+            <a:extLst>
+              <a:ext uri="{FF2B5EF4-FFF2-40B4-BE49-F238E27FC236}">
+                <a16:creationId xmlns:a16="http://schemas.microsoft.com/office/drawing/2014/main" id="{1B81A8E7-E237-8E5D-79D8-00D0F4970FDA}"/>
               </a:ext>
             </a:extLst>
           </p:cNvPr>
@@ -6812,7 +7755,7 @@
           <p:nvPr/>
         </p:nvPicPr>
         <p:blipFill>
-          <a:blip r:embed="rId3">
+          <a:blip r:embed="rId2">
             <a:extLst>
               <a:ext uri="{28A0092B-C50C-407E-A947-70E740481C1C}">
                 <a14:useLocalDpi xmlns:a14="http://schemas.microsoft.com/office/drawing/2010/main" val="0"/>
@@ -6825,18 +7768,240 @@
         </p:blipFill>
         <p:spPr>
           <a:xfrm>
-            <a:off x="6096000" y="2222828"/>
-            <a:ext cx="5904345" cy="4428259"/>
+            <a:off x="5637192" y="455362"/>
+            <a:ext cx="6135498" cy="6122795"/>
           </a:xfrm>
           <a:prstGeom prst="rect">
             <a:avLst/>
           </a:prstGeom>
+          <a:solidFill>
+            <a:srgbClr val="FFFFFF">
+              <a:shade val="85000"/>
+            </a:srgbClr>
+          </a:solidFill>
+          <a:ln w="88900" cap="sq">
+            <a:solidFill>
+              <a:srgbClr val="FFFFFF"/>
+            </a:solidFill>
+            <a:miter lim="800000"/>
+          </a:ln>
+          <a:effectLst>
+            <a:outerShdw blurRad="55000" dist="18000" dir="5400000" algn="tl" rotWithShape="0">
+              <a:srgbClr val="000000">
+                <a:alpha val="40000"/>
+              </a:srgbClr>
+            </a:outerShdw>
+          </a:effectLst>
+          <a:scene3d>
+            <a:camera prst="orthographicFront"/>
+            <a:lightRig rig="twoPt" dir="t">
+              <a:rot lat="0" lon="0" rev="7200000"/>
+            </a:lightRig>
+          </a:scene3d>
+          <a:sp3d>
+            <a:bevelT w="25400" h="19050"/>
+            <a:contourClr>
+              <a:srgbClr val="FFFFFF"/>
+            </a:contourClr>
+          </a:sp3d>
+        </p:spPr>
+      </p:pic>
+      <p:sp>
+        <p:nvSpPr>
+          <p:cNvPr id="5" name="TextBox 4">
+            <a:extLst>
+              <a:ext uri="{FF2B5EF4-FFF2-40B4-BE49-F238E27FC236}">
+                <a16:creationId xmlns:a16="http://schemas.microsoft.com/office/drawing/2014/main" id="{3FED68F9-53A4-335E-3EB2-1329F8AE662F}"/>
+              </a:ext>
+            </a:extLst>
+          </p:cNvPr>
+          <p:cNvSpPr txBox="1"/>
+          <p:nvPr/>
+        </p:nvSpPr>
+        <p:spPr>
+          <a:xfrm>
+            <a:off x="1701800" y="5931826"/>
+            <a:ext cx="3821302" cy="646331"/>
+          </a:xfrm>
+          <a:prstGeom prst="rect">
+            <a:avLst/>
+          </a:prstGeom>
+          <a:noFill/>
+        </p:spPr>
+        <p:txBody>
+          <a:bodyPr wrap="square" rtlCol="0">
+            <a:spAutoFit/>
+          </a:bodyPr>
+          <a:lstStyle/>
+          <a:p>
+            <a:r>
+              <a:rPr lang="en-US" dirty="0"/>
+              <a:t>Graph showing the first training run on the General Plant dataset.</a:t>
+            </a:r>
+          </a:p>
+        </p:txBody>
+      </p:sp>
+    </p:spTree>
+    <p:extLst>
+      <p:ext uri="{BB962C8B-B14F-4D97-AF65-F5344CB8AC3E}">
+        <p14:creationId xmlns:p14="http://schemas.microsoft.com/office/powerpoint/2010/main" val="1958893936"/>
+      </p:ext>
+    </p:extLst>
+  </p:cSld>
+  <p:clrMapOvr>
+    <a:masterClrMapping/>
+  </p:clrMapOvr>
+</p:sld>
+</file>
+
+<file path=ppt/slides/slide9.xml><?xml version="1.0" encoding="utf-8"?>
+<p:sld xmlns:a="http://schemas.openxmlformats.org/drawingml/2006/main" xmlns:r="http://schemas.openxmlformats.org/officeDocument/2006/relationships" xmlns:p="http://schemas.openxmlformats.org/presentationml/2006/main">
+  <p:cSld>
+    <p:spTree>
+      <p:nvGrpSpPr>
+        <p:cNvPr id="1" name=""/>
+        <p:cNvGrpSpPr/>
+        <p:nvPr/>
+      </p:nvGrpSpPr>
+      <p:grpSpPr>
+        <a:xfrm>
+          <a:off x="0" y="0"/>
+          <a:ext cx="0" cy="0"/>
+          <a:chOff x="0" y="0"/>
+          <a:chExt cx="0" cy="0"/>
+        </a:xfrm>
+      </p:grpSpPr>
+      <p:sp>
+        <p:nvSpPr>
+          <p:cNvPr id="2" name="Title 1">
+            <a:extLst>
+              <a:ext uri="{FF2B5EF4-FFF2-40B4-BE49-F238E27FC236}">
+                <a16:creationId xmlns:a16="http://schemas.microsoft.com/office/drawing/2014/main" id="{9F17AD4B-EBF7-73B0-8B36-10CDBD82F62C}"/>
+              </a:ext>
+            </a:extLst>
+          </p:cNvPr>
+          <p:cNvSpPr>
+            <a:spLocks noGrp="1"/>
+          </p:cNvSpPr>
+          <p:nvPr>
+            <p:ph type="title"/>
+          </p:nvPr>
+        </p:nvSpPr>
+        <p:spPr/>
+        <p:txBody>
+          <a:bodyPr/>
+          <a:lstStyle/>
+          <a:p>
+            <a:r>
+              <a:rPr lang="en-US" dirty="0"/>
+              <a:t>Results</a:t>
+            </a:r>
+          </a:p>
+        </p:txBody>
+      </p:sp>
+      <p:sp>
+        <p:nvSpPr>
+          <p:cNvPr id="3" name="Content Placeholder 2">
+            <a:extLst>
+              <a:ext uri="{FF2B5EF4-FFF2-40B4-BE49-F238E27FC236}">
+                <a16:creationId xmlns:a16="http://schemas.microsoft.com/office/drawing/2014/main" id="{B7A88171-A010-54AE-B317-710DE8585280}"/>
+              </a:ext>
+            </a:extLst>
+          </p:cNvPr>
+          <p:cNvSpPr>
+            <a:spLocks noGrp="1"/>
+          </p:cNvSpPr>
+          <p:nvPr>
+            <p:ph idx="1"/>
+          </p:nvPr>
+        </p:nvSpPr>
+        <p:spPr>
+          <a:xfrm>
+            <a:off x="1587710" y="1230571"/>
+            <a:ext cx="9486690" cy="928429"/>
+          </a:xfrm>
+        </p:spPr>
+        <p:txBody>
+          <a:bodyPr/>
+          <a:lstStyle/>
+          <a:p>
+            <a:r>
+              <a:rPr lang="en-US" dirty="0"/>
+              <a:t>After some further tuning, along with data augmentation, results improved slightly to 78% on validation data. </a:t>
+            </a:r>
+          </a:p>
+        </p:txBody>
+      </p:sp>
+      <p:pic>
+        <p:nvPicPr>
+          <p:cNvPr id="5" name="Picture 4">
+            <a:extLst>
+              <a:ext uri="{FF2B5EF4-FFF2-40B4-BE49-F238E27FC236}">
+                <a16:creationId xmlns:a16="http://schemas.microsoft.com/office/drawing/2014/main" id="{5023AE3F-945E-9312-23A4-B4122E3891B1}"/>
+              </a:ext>
+            </a:extLst>
+          </p:cNvPr>
+          <p:cNvPicPr>
+            <a:picLocks noChangeAspect="1"/>
+          </p:cNvPicPr>
+          <p:nvPr/>
+        </p:nvPicPr>
+        <p:blipFill>
+          <a:blip r:embed="rId2">
+            <a:extLst>
+              <a:ext uri="{28A0092B-C50C-407E-A947-70E740481C1C}">
+                <a14:useLocalDpi xmlns:a14="http://schemas.microsoft.com/office/drawing/2010/main" val="0"/>
+              </a:ext>
+            </a:extLst>
+          </a:blip>
+          <a:stretch>
+            <a:fillRect/>
+          </a:stretch>
+        </p:blipFill>
+        <p:spPr>
+          <a:xfrm>
+            <a:off x="7117651" y="2159000"/>
+            <a:ext cx="4515549" cy="4506200"/>
+          </a:xfrm>
+          <a:prstGeom prst="rect">
+            <a:avLst/>
+          </a:prstGeom>
+          <a:solidFill>
+            <a:srgbClr val="FFFFFF">
+              <a:shade val="85000"/>
+            </a:srgbClr>
+          </a:solidFill>
+          <a:ln w="88900" cap="sq">
+            <a:solidFill>
+              <a:srgbClr val="FFFFFF"/>
+            </a:solidFill>
+            <a:miter lim="800000"/>
+          </a:ln>
+          <a:effectLst>
+            <a:outerShdw blurRad="55000" dist="18000" dir="5400000" algn="tl" rotWithShape="0">
+              <a:srgbClr val="000000">
+                <a:alpha val="40000"/>
+              </a:srgbClr>
+            </a:outerShdw>
+          </a:effectLst>
+          <a:scene3d>
+            <a:camera prst="orthographicFront"/>
+            <a:lightRig rig="twoPt" dir="t">
+              <a:rot lat="0" lon="0" rev="7200000"/>
+            </a:lightRig>
+          </a:scene3d>
+          <a:sp3d>
+            <a:bevelT w="25400" h="19050"/>
+            <a:contourClr>
+              <a:srgbClr val="FFFFFF"/>
+            </a:contourClr>
+          </a:sp3d>
         </p:spPr>
       </p:pic>
     </p:spTree>
     <p:extLst>
       <p:ext uri="{BB962C8B-B14F-4D97-AF65-F5344CB8AC3E}">
-        <p14:creationId xmlns:p14="http://schemas.microsoft.com/office/powerpoint/2010/main" val="258563018"/>
+        <p14:creationId xmlns:p14="http://schemas.microsoft.com/office/powerpoint/2010/main" val="4284535424"/>
       </p:ext>
     </p:extLst>
   </p:cSld>

</xml_diff>